<commit_message>
Chua bai quan ly sinh vien
</commit_message>
<xml_diff>
--- a/ppt/Java core - Lecture 5 - OOP.pptx
+++ b/ppt/Java core - Lecture 5 - OOP.pptx
@@ -10447,19 +10447,7 @@
                 <a:cs typeface="Consolas"/>
                 <a:sym typeface="Consolas"/>
               </a:rPr>
-              <a:t>     AccessModifier </a:t>
-            </a:r>
-            <a:r>
-              <a:rPr lang="en" dirty="0" smtClean="0">
-                <a:highlight>
-                  <a:srgbClr val="FFFFFF"/>
-                </a:highlight>
-                <a:latin typeface="Consolas"/>
-                <a:ea typeface="Consolas"/>
-                <a:cs typeface="Consolas"/>
-                <a:sym typeface="Consolas"/>
-              </a:rPr>
-              <a:t>DataType </a:t>
+              <a:t>     AccessModifier DataType </a:t>
             </a:r>
             <a:r>
               <a:rPr lang="en" dirty="0">
@@ -10836,10 +10824,10 @@
               <a:buNone/>
             </a:pPr>
             <a:r>
-              <a:rPr lang="en"/>
+              <a:rPr lang="en" dirty="0"/>
               <a:t>Product</a:t>
             </a:r>
-            <a:endParaRPr/>
+            <a:endParaRPr dirty="0"/>
           </a:p>
           <a:p>
             <a:pPr marL="457200" lvl="0" indent="-279400" algn="l" rtl="0">
@@ -10853,10 +10841,10 @@
               <a:buChar char="-"/>
             </a:pPr>
             <a:r>
-              <a:rPr lang="en" sz="800"/>
+              <a:rPr lang="en" sz="800" dirty="0"/>
               <a:t>Price</a:t>
             </a:r>
-            <a:endParaRPr sz="800"/>
+            <a:endParaRPr sz="800" dirty="0"/>
           </a:p>
           <a:p>
             <a:pPr marL="457200" lvl="0" indent="-279400" algn="l" rtl="0">
@@ -10870,10 +10858,10 @@
               <a:buChar char="-"/>
             </a:pPr>
             <a:r>
-              <a:rPr lang="en" sz="800"/>
+              <a:rPr lang="en" sz="800" dirty="0"/>
               <a:t>Name</a:t>
             </a:r>
-            <a:endParaRPr sz="800"/>
+            <a:endParaRPr sz="800" dirty="0"/>
           </a:p>
           <a:p>
             <a:pPr marL="457200" lvl="0" indent="-279400" algn="l" rtl="0">
@@ -10887,10 +10875,10 @@
               <a:buChar char="-"/>
             </a:pPr>
             <a:r>
-              <a:rPr lang="en" sz="800"/>
+              <a:rPr lang="en" sz="800" dirty="0"/>
               <a:t>Color</a:t>
             </a:r>
-            <a:endParaRPr sz="800"/>
+            <a:endParaRPr sz="800" dirty="0"/>
           </a:p>
           <a:p>
             <a:pPr marL="457200" lvl="0" indent="-279400" algn="l" rtl="0">
@@ -10904,10 +10892,10 @@
               <a:buChar char="-"/>
             </a:pPr>
             <a:r>
-              <a:rPr lang="en" sz="800"/>
+              <a:rPr lang="en" sz="800" dirty="0"/>
               <a:t>Expired date</a:t>
             </a:r>
-            <a:endParaRPr sz="800"/>
+            <a:endParaRPr sz="800" dirty="0"/>
           </a:p>
           <a:p>
             <a:pPr marL="457200" lvl="0" indent="-279400" algn="l" rtl="0">
@@ -10921,10 +10909,10 @@
               <a:buChar char="-"/>
             </a:pPr>
             <a:r>
-              <a:rPr lang="en" sz="800"/>
+              <a:rPr lang="en" sz="800" dirty="0"/>
               <a:t>Size</a:t>
             </a:r>
-            <a:endParaRPr sz="800"/>
+            <a:endParaRPr sz="800" dirty="0"/>
           </a:p>
           <a:p>
             <a:pPr marL="0" lvl="0" indent="0" algn="l" rtl="0">
@@ -10936,7 +10924,7 @@
               </a:spcAft>
               <a:buNone/>
             </a:pPr>
-            <a:endParaRPr sz="800"/>
+            <a:endParaRPr sz="800" dirty="0"/>
           </a:p>
           <a:p>
             <a:pPr marL="0" lvl="0" indent="0" algn="l" rtl="0">
@@ -10949,10 +10937,10 @@
               <a:buNone/>
             </a:pPr>
             <a:r>
-              <a:rPr lang="en" sz="800"/>
+              <a:rPr lang="en" sz="800" dirty="0"/>
               <a:t>getProductByColor(String color);</a:t>
             </a:r>
-            <a:endParaRPr sz="800"/>
+            <a:endParaRPr sz="800" dirty="0"/>
           </a:p>
           <a:p>
             <a:pPr marL="0" lvl="0" indent="0" algn="l" rtl="0">
@@ -10965,10 +10953,10 @@
               <a:buNone/>
             </a:pPr>
             <a:r>
-              <a:rPr lang="en" sz="800"/>
+              <a:rPr lang="en" sz="800" dirty="0"/>
               <a:t>getProductBySize(Int size);</a:t>
             </a:r>
-            <a:endParaRPr sz="800"/>
+            <a:endParaRPr sz="800" dirty="0"/>
           </a:p>
         </p:txBody>
       </p:sp>
@@ -11015,10 +11003,10 @@
               <a:buNone/>
             </a:pPr>
             <a:r>
-              <a:rPr lang="en"/>
+              <a:rPr lang="en" dirty="0"/>
               <a:t>Customer</a:t>
             </a:r>
-            <a:endParaRPr/>
+            <a:endParaRPr dirty="0"/>
           </a:p>
           <a:p>
             <a:pPr marL="457200" lvl="0" indent="-279400" algn="l" rtl="0">
@@ -11032,10 +11020,10 @@
               <a:buChar char="-"/>
             </a:pPr>
             <a:r>
-              <a:rPr lang="en" sz="800"/>
+              <a:rPr lang="en" sz="800" dirty="0"/>
               <a:t>Name</a:t>
             </a:r>
-            <a:endParaRPr sz="800"/>
+            <a:endParaRPr sz="800" dirty="0"/>
           </a:p>
           <a:p>
             <a:pPr marL="457200" lvl="0" indent="-279400" algn="l" rtl="0">
@@ -11049,10 +11037,10 @@
               <a:buChar char="-"/>
             </a:pPr>
             <a:r>
-              <a:rPr lang="en" sz="800"/>
+              <a:rPr lang="en" sz="800" dirty="0"/>
               <a:t>Phone</a:t>
             </a:r>
-            <a:endParaRPr sz="800"/>
+            <a:endParaRPr sz="800" dirty="0"/>
           </a:p>
           <a:p>
             <a:pPr marL="457200" lvl="0" indent="-279400" algn="l" rtl="0">
@@ -11066,10 +11054,10 @@
               <a:buChar char="-"/>
             </a:pPr>
             <a:r>
-              <a:rPr lang="en" sz="800"/>
+              <a:rPr lang="en" sz="800" dirty="0"/>
               <a:t>Address</a:t>
             </a:r>
-            <a:endParaRPr sz="800"/>
+            <a:endParaRPr sz="800" dirty="0"/>
           </a:p>
           <a:p>
             <a:pPr marL="457200" lvl="0" indent="-279400" algn="l" rtl="0">
@@ -11083,10 +11071,10 @@
               <a:buChar char="-"/>
             </a:pPr>
             <a:r>
-              <a:rPr lang="en" sz="800"/>
+              <a:rPr lang="en" sz="800" dirty="0"/>
               <a:t>Customer Code</a:t>
             </a:r>
-            <a:endParaRPr sz="800"/>
+            <a:endParaRPr sz="800" dirty="0"/>
           </a:p>
           <a:p>
             <a:pPr marL="457200" lvl="0" indent="-279400" algn="l" rtl="0">
@@ -11100,10 +11088,10 @@
               <a:buChar char="-"/>
             </a:pPr>
             <a:r>
-              <a:rPr lang="en" sz="800"/>
+              <a:rPr lang="en" sz="800" dirty="0"/>
               <a:t>Point</a:t>
             </a:r>
-            <a:endParaRPr sz="800"/>
+            <a:endParaRPr sz="800" dirty="0"/>
           </a:p>
           <a:p>
             <a:pPr marL="457200" lvl="0" indent="-279400" algn="l" rtl="0">
@@ -11117,10 +11105,10 @@
               <a:buChar char="-"/>
             </a:pPr>
             <a:r>
-              <a:rPr lang="en" sz="800"/>
+              <a:rPr lang="en" sz="800" dirty="0"/>
               <a:t>Style</a:t>
             </a:r>
-            <a:endParaRPr sz="800"/>
+            <a:endParaRPr sz="800" dirty="0"/>
           </a:p>
           <a:p>
             <a:pPr marL="0" lvl="0" indent="0" algn="l" rtl="0">
@@ -11132,7 +11120,7 @@
               </a:spcAft>
               <a:buNone/>
             </a:pPr>
-            <a:endParaRPr sz="800"/>
+            <a:endParaRPr sz="800" dirty="0"/>
           </a:p>
           <a:p>
             <a:pPr marL="0" lvl="0" indent="0" algn="l" rtl="0">
@@ -11145,10 +11133,10 @@
               <a:buNone/>
             </a:pPr>
             <a:r>
-              <a:rPr lang="en" sz="800"/>
+              <a:rPr lang="en" sz="800" dirty="0"/>
               <a:t>getCustomerByStyle(String style);</a:t>
             </a:r>
-            <a:endParaRPr sz="800"/>
+            <a:endParaRPr sz="800" dirty="0"/>
           </a:p>
           <a:p>
             <a:pPr marL="0" lvl="0" indent="0" algn="l" rtl="0">
@@ -11161,10 +11149,10 @@
               <a:buNone/>
             </a:pPr>
             <a:r>
-              <a:rPr lang="en" sz="800"/>
+              <a:rPr lang="en" sz="800" dirty="0"/>
               <a:t>getCustomerByPointDesc();</a:t>
             </a:r>
-            <a:endParaRPr sz="800"/>
+            <a:endParaRPr sz="800" dirty="0"/>
           </a:p>
           <a:p>
             <a:pPr marL="457200" lvl="0" indent="0" algn="l" rtl="0">
@@ -11176,7 +11164,7 @@
               </a:spcAft>
               <a:buNone/>
             </a:pPr>
-            <a:endParaRPr sz="800"/>
+            <a:endParaRPr sz="800" dirty="0"/>
           </a:p>
         </p:txBody>
       </p:sp>
@@ -11371,7 +11359,7 @@
               <a:buNone/>
             </a:pPr>
             <a:r>
-              <a:rPr lang="en">
+              <a:rPr lang="en" dirty="0">
                 <a:highlight>
                   <a:srgbClr val="FFFFFF"/>
                 </a:highlight>
@@ -11382,7 +11370,7 @@
               </a:rPr>
               <a:t>ClassName ten_khoi_tao = new ClassName();</a:t>
             </a:r>
-            <a:endParaRPr>
+            <a:endParaRPr dirty="0">
               <a:highlight>
                 <a:srgbClr val="FFFFFF"/>
               </a:highlight>
@@ -11405,7 +11393,7 @@
               </a:spcAft>
               <a:buNone/>
             </a:pPr>
-            <a:endParaRPr>
+            <a:endParaRPr dirty="0">
               <a:highlight>
                 <a:srgbClr val="FFFFFF"/>
               </a:highlight>
@@ -11919,14 +11907,14 @@
               <a:buNone/>
             </a:pPr>
             <a:r>
-              <a:rPr lang="en">
+              <a:rPr lang="en" dirty="0">
                 <a:solidFill>
                   <a:srgbClr val="FFFFFF"/>
                 </a:solidFill>
               </a:rPr>
               <a:t>	Access Modifiers</a:t>
             </a:r>
-            <a:endParaRPr>
+            <a:endParaRPr dirty="0">
               <a:solidFill>
                 <a:srgbClr val="FFFFFF"/>
               </a:solidFill>
@@ -12049,7 +12037,7 @@
                         <a:buNone/>
                       </a:pPr>
                       <a:r>
-                        <a:rPr lang="en">
+                        <a:rPr lang="en" dirty="0">
                           <a:solidFill>
                             <a:srgbClr val="2876C9"/>
                           </a:solidFill>
@@ -12059,7 +12047,7 @@
                         </a:rPr>
                         <a:t>Access Modifier</a:t>
                       </a:r>
-                      <a:endParaRPr>
+                      <a:endParaRPr dirty="0">
                         <a:solidFill>
                           <a:srgbClr val="2876C9"/>
                         </a:solidFill>
@@ -12126,7 +12114,7 @@
                         <a:buNone/>
                       </a:pPr>
                       <a:r>
-                        <a:rPr lang="en">
+                        <a:rPr lang="en" dirty="0">
                           <a:solidFill>
                             <a:srgbClr val="2876C9"/>
                           </a:solidFill>
@@ -12136,7 +12124,7 @@
                         </a:rPr>
                         <a:t>Truy cập bên trong class?</a:t>
                       </a:r>
-                      <a:endParaRPr>
+                      <a:endParaRPr dirty="0">
                         <a:solidFill>
                           <a:srgbClr val="2876C9"/>
                         </a:solidFill>
@@ -12203,7 +12191,7 @@
                         <a:buNone/>
                       </a:pPr>
                       <a:r>
-                        <a:rPr lang="en">
+                        <a:rPr lang="en" dirty="0">
                           <a:solidFill>
                             <a:srgbClr val="2876C9"/>
                           </a:solidFill>
@@ -12213,7 +12201,7 @@
                         </a:rPr>
                         <a:t>Truy cập bên trong package?</a:t>
                       </a:r>
-                      <a:endParaRPr>
+                      <a:endParaRPr dirty="0">
                         <a:solidFill>
                           <a:srgbClr val="2876C9"/>
                         </a:solidFill>
@@ -12436,7 +12424,7 @@
                         <a:buNone/>
                       </a:pPr>
                       <a:r>
-                        <a:rPr lang="en" sz="1200" b="1">
+                        <a:rPr lang="en" sz="1200" b="1" dirty="0">
                           <a:solidFill>
                             <a:srgbClr val="2876C9"/>
                           </a:solidFill>
@@ -12446,7 +12434,7 @@
                         </a:rPr>
                         <a:t>private</a:t>
                       </a:r>
-                      <a:endParaRPr sz="1200" b="1">
+                      <a:endParaRPr sz="1200" b="1" dirty="0">
                         <a:solidFill>
                           <a:srgbClr val="2876C9"/>
                         </a:solidFill>
@@ -12513,7 +12501,7 @@
                         <a:buNone/>
                       </a:pPr>
                       <a:r>
-                        <a:rPr lang="en" sz="1200">
+                        <a:rPr lang="en" sz="1200" dirty="0">
                           <a:solidFill>
                             <a:srgbClr val="2876C9"/>
                           </a:solidFill>
@@ -12523,7 +12511,7 @@
                         </a:rPr>
                         <a:t>Y</a:t>
                       </a:r>
-                      <a:endParaRPr sz="1200">
+                      <a:endParaRPr sz="1200" dirty="0">
                         <a:solidFill>
                           <a:srgbClr val="2876C9"/>
                         </a:solidFill>
@@ -12590,7 +12578,7 @@
                         <a:buNone/>
                       </a:pPr>
                       <a:r>
-                        <a:rPr lang="en" sz="1200">
+                        <a:rPr lang="en" sz="1200" dirty="0">
                           <a:solidFill>
                             <a:srgbClr val="2876C9"/>
                           </a:solidFill>
@@ -12600,7 +12588,7 @@
                         </a:rPr>
                         <a:t> </a:t>
                       </a:r>
-                      <a:endParaRPr sz="1200">
+                      <a:endParaRPr sz="1200" dirty="0">
                         <a:solidFill>
                           <a:srgbClr val="2876C9"/>
                         </a:solidFill>
@@ -12667,7 +12655,7 @@
                         <a:buNone/>
                       </a:pPr>
                       <a:r>
-                        <a:rPr lang="en" sz="1200">
+                        <a:rPr lang="en" sz="1200" dirty="0">
                           <a:solidFill>
                             <a:srgbClr val="2876C9"/>
                           </a:solidFill>
@@ -12677,7 +12665,7 @@
                         </a:rPr>
                         <a:t> </a:t>
                       </a:r>
-                      <a:endParaRPr sz="1200">
+                      <a:endParaRPr sz="1200" dirty="0">
                         <a:solidFill>
                           <a:srgbClr val="2876C9"/>
                         </a:solidFill>
@@ -12823,7 +12811,7 @@
                         <a:buNone/>
                       </a:pPr>
                       <a:r>
-                        <a:rPr lang="en" sz="1200" b="1">
+                        <a:rPr lang="en" sz="1200" b="1" dirty="0">
                           <a:solidFill>
                             <a:srgbClr val="2876C9"/>
                           </a:solidFill>
@@ -12833,7 +12821,7 @@
                         </a:rPr>
                         <a:t>default</a:t>
                       </a:r>
-                      <a:endParaRPr sz="1200" b="1">
+                      <a:endParaRPr sz="1200" b="1" dirty="0">
                         <a:solidFill>
                           <a:srgbClr val="2876C9"/>
                         </a:solidFill>
@@ -12900,7 +12888,7 @@
                         <a:buNone/>
                       </a:pPr>
                       <a:r>
-                        <a:rPr lang="en" sz="1200">
+                        <a:rPr lang="en" sz="1200" dirty="0">
                           <a:solidFill>
                             <a:srgbClr val="2876C9"/>
                           </a:solidFill>
@@ -12910,7 +12898,7 @@
                         </a:rPr>
                         <a:t>Y</a:t>
                       </a:r>
-                      <a:endParaRPr sz="1200">
+                      <a:endParaRPr sz="1200" dirty="0">
                         <a:solidFill>
                           <a:srgbClr val="2876C9"/>
                         </a:solidFill>
@@ -12977,7 +12965,7 @@
                         <a:buNone/>
                       </a:pPr>
                       <a:r>
-                        <a:rPr lang="en" sz="1200">
+                        <a:rPr lang="en" sz="1200" dirty="0">
                           <a:solidFill>
                             <a:srgbClr val="2876C9"/>
                           </a:solidFill>
@@ -12987,7 +12975,7 @@
                         </a:rPr>
                         <a:t>Y</a:t>
                       </a:r>
-                      <a:endParaRPr sz="1200">
+                      <a:endParaRPr sz="1200" dirty="0">
                         <a:solidFill>
                           <a:srgbClr val="2876C9"/>
                         </a:solidFill>
@@ -13054,7 +13042,7 @@
                         <a:buNone/>
                       </a:pPr>
                       <a:r>
-                        <a:rPr lang="en" sz="1200">
+                        <a:rPr lang="en" sz="1200" dirty="0">
                           <a:solidFill>
                             <a:srgbClr val="2876C9"/>
                           </a:solidFill>
@@ -13064,7 +13052,7 @@
                         </a:rPr>
                         <a:t> </a:t>
                       </a:r>
-                      <a:endParaRPr sz="1200">
+                      <a:endParaRPr sz="1200" dirty="0">
                         <a:solidFill>
                           <a:srgbClr val="2876C9"/>
                         </a:solidFill>
@@ -13131,7 +13119,7 @@
                         <a:buNone/>
                       </a:pPr>
                       <a:r>
-                        <a:rPr lang="en" sz="1200">
+                        <a:rPr lang="en" sz="1200" dirty="0">
                           <a:solidFill>
                             <a:srgbClr val="2876C9"/>
                           </a:solidFill>
@@ -13141,7 +13129,7 @@
                         </a:rPr>
                         <a:t> </a:t>
                       </a:r>
-                      <a:endParaRPr sz="1200">
+                      <a:endParaRPr sz="1200" dirty="0">
                         <a:solidFill>
                           <a:srgbClr val="2876C9"/>
                         </a:solidFill>
@@ -13210,7 +13198,7 @@
                         <a:buNone/>
                       </a:pPr>
                       <a:r>
-                        <a:rPr lang="en" sz="1200" b="1">
+                        <a:rPr lang="en" sz="1200" b="1" dirty="0">
                           <a:solidFill>
                             <a:srgbClr val="2876C9"/>
                           </a:solidFill>
@@ -13220,7 +13208,7 @@
                         </a:rPr>
                         <a:t>protected</a:t>
                       </a:r>
-                      <a:endParaRPr sz="1200" b="1">
+                      <a:endParaRPr sz="1200" b="1" dirty="0">
                         <a:solidFill>
                           <a:srgbClr val="2876C9"/>
                         </a:solidFill>
@@ -13287,7 +13275,7 @@
                         <a:buNone/>
                       </a:pPr>
                       <a:r>
-                        <a:rPr lang="en" sz="1200">
+                        <a:rPr lang="en" sz="1200" dirty="0">
                           <a:solidFill>
                             <a:srgbClr val="2876C9"/>
                           </a:solidFill>
@@ -13297,7 +13285,7 @@
                         </a:rPr>
                         <a:t>Y</a:t>
                       </a:r>
-                      <a:endParaRPr sz="1200">
+                      <a:endParaRPr sz="1200" dirty="0">
                         <a:solidFill>
                           <a:srgbClr val="2876C9"/>
                         </a:solidFill>
@@ -13364,7 +13352,7 @@
                         <a:buNone/>
                       </a:pPr>
                       <a:r>
-                        <a:rPr lang="en" sz="1200">
+                        <a:rPr lang="en" sz="1200" dirty="0">
                           <a:solidFill>
                             <a:srgbClr val="2876C9"/>
                           </a:solidFill>
@@ -13374,7 +13362,7 @@
                         </a:rPr>
                         <a:t>Y</a:t>
                       </a:r>
-                      <a:endParaRPr sz="1200">
+                      <a:endParaRPr sz="1200" dirty="0">
                         <a:solidFill>
                           <a:srgbClr val="2876C9"/>
                         </a:solidFill>
@@ -13441,7 +13429,7 @@
                         <a:buNone/>
                       </a:pPr>
                       <a:r>
-                        <a:rPr lang="en" sz="1200">
+                        <a:rPr lang="en" sz="1200" dirty="0">
                           <a:solidFill>
                             <a:srgbClr val="2876C9"/>
                           </a:solidFill>
@@ -13451,7 +13439,7 @@
                         </a:rPr>
                         <a:t>Y</a:t>
                       </a:r>
-                      <a:endParaRPr sz="1200">
+                      <a:endParaRPr sz="1200" dirty="0">
                         <a:solidFill>
                           <a:srgbClr val="2876C9"/>
                         </a:solidFill>
@@ -13518,7 +13506,7 @@
                         <a:buNone/>
                       </a:pPr>
                       <a:r>
-                        <a:rPr lang="en" sz="1200">
+                        <a:rPr lang="en" sz="1200" dirty="0">
                           <a:solidFill>
                             <a:srgbClr val="2876C9"/>
                           </a:solidFill>
@@ -13528,7 +13516,7 @@
                         </a:rPr>
                         <a:t> </a:t>
                       </a:r>
-                      <a:endParaRPr sz="1200">
+                      <a:endParaRPr sz="1200" dirty="0">
                         <a:solidFill>
                           <a:srgbClr val="2876C9"/>
                         </a:solidFill>
@@ -13597,7 +13585,7 @@
                         <a:buNone/>
                       </a:pPr>
                       <a:r>
-                        <a:rPr lang="en" sz="1200" b="1">
+                        <a:rPr lang="en" sz="1200" b="1" dirty="0">
                           <a:solidFill>
                             <a:srgbClr val="2876C9"/>
                           </a:solidFill>
@@ -13607,7 +13595,7 @@
                         </a:rPr>
                         <a:t>public</a:t>
                       </a:r>
-                      <a:endParaRPr sz="1200" b="1">
+                      <a:endParaRPr sz="1200" b="1" dirty="0">
                         <a:solidFill>
                           <a:srgbClr val="2876C9"/>
                         </a:solidFill>
@@ -13674,7 +13662,7 @@
                         <a:buNone/>
                       </a:pPr>
                       <a:r>
-                        <a:rPr lang="en" sz="1200">
+                        <a:rPr lang="en" sz="1200" dirty="0">
                           <a:solidFill>
                             <a:srgbClr val="2876C9"/>
                           </a:solidFill>
@@ -13684,7 +13672,7 @@
                         </a:rPr>
                         <a:t>Y</a:t>
                       </a:r>
-                      <a:endParaRPr sz="1200">
+                      <a:endParaRPr sz="1200" dirty="0">
                         <a:solidFill>
                           <a:srgbClr val="2876C9"/>
                         </a:solidFill>
@@ -13751,7 +13739,7 @@
                         <a:buNone/>
                       </a:pPr>
                       <a:r>
-                        <a:rPr lang="en" sz="1200">
+                        <a:rPr lang="en" sz="1200" dirty="0">
                           <a:solidFill>
                             <a:srgbClr val="2876C9"/>
                           </a:solidFill>
@@ -13761,7 +13749,7 @@
                         </a:rPr>
                         <a:t>Y</a:t>
                       </a:r>
-                      <a:endParaRPr sz="1200">
+                      <a:endParaRPr sz="1200" dirty="0">
                         <a:solidFill>
                           <a:srgbClr val="2876C9"/>
                         </a:solidFill>
@@ -13828,7 +13816,7 @@
                         <a:buNone/>
                       </a:pPr>
                       <a:r>
-                        <a:rPr lang="en" sz="1200">
+                        <a:rPr lang="en" sz="1200" dirty="0">
                           <a:solidFill>
                             <a:srgbClr val="2876C9"/>
                           </a:solidFill>
@@ -13838,7 +13826,7 @@
                         </a:rPr>
                         <a:t>Y</a:t>
                       </a:r>
-                      <a:endParaRPr sz="1200">
+                      <a:endParaRPr sz="1200" dirty="0">
                         <a:solidFill>
                           <a:srgbClr val="2876C9"/>
                         </a:solidFill>
@@ -13905,7 +13893,7 @@
                         <a:buNone/>
                       </a:pPr>
                       <a:r>
-                        <a:rPr lang="en" sz="1200">
+                        <a:rPr lang="en" sz="1200" dirty="0">
                           <a:solidFill>
                             <a:srgbClr val="2876C9"/>
                           </a:solidFill>
@@ -13915,7 +13903,7 @@
                         </a:rPr>
                         <a:t>Y</a:t>
                       </a:r>
-                      <a:endParaRPr sz="1200">
+                      <a:endParaRPr sz="1200" dirty="0">
                         <a:solidFill>
                           <a:srgbClr val="2876C9"/>
                         </a:solidFill>
@@ -14326,7 +14314,7 @@
           <p:nvPr>
             <p:extLst>
               <p:ext uri="{D42A27DB-BD31-4B8C-83A1-F6EECF244321}">
-                <p14:modId xmlns:p14="http://schemas.microsoft.com/office/powerpoint/2010/main" val="1066245378"/>
+                <p14:modId xmlns:p14="http://schemas.microsoft.com/office/powerpoint/2010/main" val="2414972490"/>
               </p:ext>
             </p:extLst>
           </p:nvPr>
@@ -14604,14 +14592,14 @@
                         <a:buNone/>
                       </a:pPr>
                       <a:r>
-                        <a:rPr lang="en" sz="1200">
+                        <a:rPr lang="en" sz="1200" dirty="0">
                           <a:solidFill>
                             <a:srgbClr val="2876C9"/>
                           </a:solidFill>
                         </a:rPr>
                         <a:t>Phương thức được sử dụng để thể hiện hành động của một đối tượng.</a:t>
                       </a:r>
-                      <a:endParaRPr sz="1200">
+                      <a:endParaRPr sz="1200" dirty="0">
                         <a:solidFill>
                           <a:srgbClr val="2876C9"/>
                         </a:solidFill>
@@ -14748,14 +14736,14 @@
                         <a:buNone/>
                       </a:pPr>
                       <a:r>
-                        <a:rPr lang="en" sz="1200">
+                        <a:rPr lang="en" sz="1200" dirty="0">
                           <a:solidFill>
                             <a:srgbClr val="2876C9"/>
                           </a:solidFill>
                         </a:rPr>
                         <a:t>Phương thức có kiểu trả về.</a:t>
                       </a:r>
-                      <a:endParaRPr sz="1200">
+                      <a:endParaRPr sz="1200" dirty="0">
                         <a:solidFill>
                           <a:srgbClr val="2876C9"/>
                         </a:solidFill>
@@ -14826,7 +14814,39 @@
                             <a:srgbClr val="2876C9"/>
                           </a:solidFill>
                         </a:rPr>
-                        <a:t>Constructor được gọi ngầm</a:t>
+                        <a:t>Constructor </a:t>
+                      </a:r>
+                      <a:r>
+                        <a:rPr lang="en" sz="1200" dirty="0" smtClean="0">
+                          <a:solidFill>
+                            <a:srgbClr val="2876C9"/>
+                          </a:solidFill>
+                        </a:rPr>
+                        <a:t>có</a:t>
+                      </a:r>
+                      <a:r>
+                        <a:rPr lang="en" sz="1200" baseline="0" dirty="0" smtClean="0">
+                          <a:solidFill>
+                            <a:srgbClr val="2876C9"/>
+                          </a:solidFill>
+                        </a:rPr>
+                        <a:t> thể </a:t>
+                      </a:r>
+                      <a:r>
+                        <a:rPr lang="en" sz="1200" dirty="0" smtClean="0">
+                          <a:solidFill>
+                            <a:srgbClr val="2876C9"/>
+                          </a:solidFill>
+                        </a:rPr>
+                        <a:t>gọi </a:t>
+                      </a:r>
+                      <a:r>
+                        <a:rPr lang="en" sz="1200" dirty="0">
+                          <a:solidFill>
+                            <a:srgbClr val="2876C9"/>
+                          </a:solidFill>
+                        </a:rPr>
+                        <a:t>ngầm</a:t>
                       </a:r>
                       <a:r>
                         <a:rPr lang="en" sz="1200" dirty="0" smtClean="0">
@@ -14908,14 +14928,14 @@
                         <a:buNone/>
                       </a:pPr>
                       <a:r>
-                        <a:rPr lang="en" sz="1200">
+                        <a:rPr lang="en" sz="1200" dirty="0">
                           <a:solidFill>
                             <a:srgbClr val="2876C9"/>
                           </a:solidFill>
                         </a:rPr>
                         <a:t>Phương thức được gọi tường minh.</a:t>
                       </a:r>
-                      <a:endParaRPr sz="1200">
+                      <a:endParaRPr sz="1200" dirty="0">
                         <a:solidFill>
                           <a:srgbClr val="2876C9"/>
                         </a:solidFill>
@@ -15475,7 +15495,7 @@
               <a:buNone/>
             </a:pPr>
             <a:r>
-              <a:rPr lang="en">
+              <a:rPr lang="en" dirty="0">
                 <a:solidFill>
                   <a:srgbClr val="2876C9"/>
                 </a:solidFill>
@@ -15483,7 +15503,7 @@
               <a:t>- Định nghĩa khả năng truy cập cho các thuộc tính </a:t>
             </a:r>
             <a:r>
-              <a:rPr lang="en" i="1">
+              <a:rPr lang="en" i="1" dirty="0">
                 <a:solidFill>
                   <a:srgbClr val="980000"/>
                 </a:solidFill>
@@ -15491,7 +15511,7 @@
               <a:t>private</a:t>
             </a:r>
             <a:r>
-              <a:rPr lang="en" i="1">
+              <a:rPr lang="en" i="1" dirty="0">
                 <a:solidFill>
                   <a:srgbClr val="2876C9"/>
                 </a:solidFill>
@@ -15499,14 +15519,14 @@
               <a:t> </a:t>
             </a:r>
             <a:r>
-              <a:rPr lang="en">
+              <a:rPr lang="en" dirty="0">
                 <a:solidFill>
                   <a:srgbClr val="2876C9"/>
                 </a:solidFill>
               </a:rPr>
               <a:t>trong một lớp.</a:t>
             </a:r>
-            <a:endParaRPr>
+            <a:endParaRPr dirty="0">
               <a:solidFill>
                 <a:srgbClr val="2876C9"/>
               </a:solidFill>
@@ -15526,7 +15546,7 @@
               <a:buNone/>
             </a:pPr>
             <a:r>
-              <a:rPr lang="en">
+              <a:rPr lang="en" dirty="0">
                 <a:solidFill>
                   <a:srgbClr val="2876C9"/>
                 </a:solidFill>
@@ -15534,7 +15554,7 @@
               <a:t>- </a:t>
             </a:r>
             <a:r>
-              <a:rPr lang="en">
+              <a:rPr lang="en" dirty="0">
                 <a:solidFill>
                   <a:srgbClr val="2876C9"/>
                 </a:solidFill>
@@ -15545,7 +15565,7 @@
               <a:t>Xây dựng phương thức </a:t>
             </a:r>
             <a:r>
-              <a:rPr lang="en" i="1">
+              <a:rPr lang="en" i="1" dirty="0">
                 <a:solidFill>
                   <a:srgbClr val="2876C9"/>
                 </a:solidFill>
@@ -15556,7 +15576,7 @@
               <a:t>getter</a:t>
             </a:r>
             <a:r>
-              <a:rPr lang="en">
+              <a:rPr lang="en" dirty="0">
                 <a:solidFill>
                   <a:srgbClr val="2876C9"/>
                 </a:solidFill>
@@ -15567,7 +15587,7 @@
               <a:t> hay </a:t>
             </a:r>
             <a:r>
-              <a:rPr lang="en" i="1">
+              <a:rPr lang="en" i="1" dirty="0">
                 <a:solidFill>
                   <a:srgbClr val="2876C9"/>
                 </a:solidFill>
@@ -15578,7 +15598,7 @@
               <a:t>setter</a:t>
             </a:r>
             <a:r>
-              <a:rPr lang="en">
+              <a:rPr lang="en" dirty="0">
                 <a:solidFill>
                   <a:srgbClr val="2876C9"/>
                 </a:solidFill>
@@ -15589,7 +15609,7 @@
               <a:t> cho từng thuộc tính </a:t>
             </a:r>
             <a:r>
-              <a:rPr lang="en" i="1">
+              <a:rPr lang="en" i="1" dirty="0">
                 <a:solidFill>
                   <a:srgbClr val="980000"/>
                 </a:solidFill>
@@ -15600,7 +15620,7 @@
               <a:t>private</a:t>
             </a:r>
             <a:r>
-              <a:rPr lang="en">
+              <a:rPr lang="en" dirty="0">
                 <a:solidFill>
                   <a:srgbClr val="2876C9"/>
                 </a:solidFill>
@@ -15610,7 +15630,7 @@
               </a:rPr>
               <a:t>. </a:t>
             </a:r>
-            <a:endParaRPr>
+            <a:endParaRPr dirty="0">
               <a:solidFill>
                 <a:srgbClr val="2876C9"/>
               </a:solidFill>
@@ -15633,7 +15653,7 @@
               <a:buNone/>
             </a:pPr>
             <a:r>
-              <a:rPr lang="en" i="1">
+              <a:rPr lang="en" i="1" dirty="0">
                 <a:solidFill>
                   <a:srgbClr val="434343"/>
                 </a:solidFill>
@@ -15644,7 +15664,7 @@
               <a:t>setTênThuộcTính()</a:t>
             </a:r>
             <a:r>
-              <a:rPr lang="en">
+              <a:rPr lang="en" dirty="0">
                 <a:solidFill>
                   <a:srgbClr val="434343"/>
                 </a:solidFill>
@@ -15654,7 +15674,7 @@
               </a:rPr>
               <a:t> </a:t>
             </a:r>
-            <a:endParaRPr>
+            <a:endParaRPr dirty="0">
               <a:solidFill>
                 <a:srgbClr val="434343"/>
               </a:solidFill>
@@ -15677,7 +15697,7 @@
               <a:buNone/>
             </a:pPr>
             <a:r>
-              <a:rPr lang="en" i="1">
+              <a:rPr lang="en" i="1" dirty="0">
                 <a:solidFill>
                   <a:srgbClr val="434343"/>
                 </a:solidFill>
@@ -15687,7 +15707,7 @@
               </a:rPr>
               <a:t>getTênThuộcTính()</a:t>
             </a:r>
-            <a:endParaRPr i="1">
+            <a:endParaRPr i="1" dirty="0">
               <a:solidFill>
                 <a:srgbClr val="434343"/>
               </a:solidFill>
@@ -15710,7 +15730,7 @@
               <a:buNone/>
             </a:pPr>
             <a:r>
-              <a:rPr lang="en">
+              <a:rPr lang="en" dirty="0">
                 <a:solidFill>
                   <a:srgbClr val="2876C9"/>
                 </a:solidFill>
@@ -15721,7 +15741,7 @@
               <a:t>- </a:t>
             </a:r>
             <a:r>
-              <a:rPr lang="en" sz="1350">
+              <a:rPr lang="en" sz="1350" dirty="0">
                 <a:solidFill>
                   <a:srgbClr val="2876C9"/>
                 </a:solidFill>
@@ -15731,7 +15751,7 @@
               </a:rPr>
               <a:t>Không bắt buộc</a:t>
             </a:r>
-            <a:endParaRPr>
+            <a:endParaRPr dirty="0">
               <a:solidFill>
                 <a:srgbClr val="2876C9"/>
               </a:solidFill>
@@ -16055,43 +16075,20 @@
               <a:buAutoNum type="arabicPeriod"/>
             </a:pPr>
             <a:r>
+              <a:rPr lang="en" dirty="0" smtClean="0">
+                <a:solidFill>
+                  <a:srgbClr val="2876C9"/>
+                </a:solidFill>
+              </a:rPr>
+              <a:t>Từ </a:t>
+            </a:r>
+            <a:r>
               <a:rPr lang="en" dirty="0">
                 <a:solidFill>
                   <a:srgbClr val="2876C9"/>
                 </a:solidFill>
               </a:rPr>
-              <a:t>Từ khóa this có thể được truyền như một tham số trong phương Constructor.</a:t>
-            </a:r>
-            <a:endParaRPr dirty="0">
-              <a:solidFill>
-                <a:srgbClr val="2876C9"/>
-              </a:solidFill>
-            </a:endParaRPr>
-          </a:p>
-          <a:p>
-            <a:pPr marL="457200" marR="25400" lvl="0" indent="-317500" algn="l" rtl="0">
-              <a:lnSpc>
-                <a:spcPct val="176087"/>
-              </a:lnSpc>
-              <a:spcBef>
-                <a:spcPts val="0"/>
-              </a:spcBef>
-              <a:spcAft>
-                <a:spcPts val="0"/>
-              </a:spcAft>
-              <a:buClr>
-                <a:srgbClr val="2876C9"/>
-              </a:buClr>
-              <a:buSzPts val="1400"/>
-              <a:buAutoNum type="arabicPeriod"/>
-            </a:pPr>
-            <a:r>
-              <a:rPr lang="en" dirty="0">
-                <a:solidFill>
-                  <a:srgbClr val="2876C9"/>
-                </a:solidFill>
-              </a:rPr>
-              <a:t>Từ khóa this có thể được dùng để trả về instance của lớp hiện tại.</a:t>
+              <a:t>khóa this có thể được dùng để trả về instance của lớp hiện tại.</a:t>
             </a:r>
             <a:endParaRPr dirty="0">
               <a:solidFill>
@@ -16408,12 +16405,12 @@
               <a:buChar char="➔"/>
             </a:pPr>
             <a:r>
-              <a:rPr lang="en" dirty="0">
+              <a:rPr lang="en" dirty="0" smtClean="0">
                 <a:solidFill>
                   <a:srgbClr val="2876C9"/>
                 </a:solidFill>
               </a:rPr>
-              <a:t>Constructors, getters, setters</a:t>
+              <a:t>Constructors</a:t>
             </a:r>
             <a:endParaRPr dirty="0">
               <a:solidFill>
@@ -16650,11 +16647,6 @@
               </a:rPr>
               <a:t>OOP là gì</a:t>
             </a:r>
-            <a:endParaRPr lang="en" dirty="0" smtClean="0">
-              <a:solidFill>
-                <a:srgbClr val="2876C9"/>
-              </a:solidFill>
-            </a:endParaRPr>
           </a:p>
           <a:p>
             <a:pPr marL="457200" lvl="0" indent="-317500" algn="l" rtl="0">
@@ -18270,14 +18262,14 @@
               <a:buNone/>
             </a:pPr>
             <a:r>
-              <a:rPr lang="en">
+              <a:rPr lang="en" dirty="0">
                 <a:solidFill>
                   <a:srgbClr val="FFFFFF"/>
                 </a:solidFill>
               </a:rPr>
               <a:t>Class và Object</a:t>
             </a:r>
-            <a:endParaRPr>
+            <a:endParaRPr dirty="0">
               <a:solidFill>
                 <a:srgbClr val="FFFFFF"/>
               </a:solidFill>

</xml_diff>